<commit_message>
pp until desafio 16 ready
</commit_message>
<xml_diff>
--- a/Classification/presentacion_clasificador.pptx
+++ b/Classification/presentacion_clasificador.pptx
@@ -11,8 +11,14 @@
     <p:sldId id="260" r:id="rId5"/>
     <p:sldId id="261" r:id="rId6"/>
     <p:sldId id="262" r:id="rId7"/>
-    <p:sldId id="264" r:id="rId8"/>
-    <p:sldId id="263" r:id="rId9"/>
+    <p:sldId id="263" r:id="rId8"/>
+    <p:sldId id="264" r:id="rId9"/>
+    <p:sldId id="266" r:id="rId10"/>
+    <p:sldId id="267" r:id="rId11"/>
+    <p:sldId id="268" r:id="rId12"/>
+    <p:sldId id="269" r:id="rId13"/>
+    <p:sldId id="270" r:id="rId14"/>
+    <p:sldId id="271" r:id="rId15"/>
   </p:sldIdLst>
   <p:sldSz cx="12192000" cy="6858000"/>
   <p:notesSz cx="6858000" cy="9144000"/>
@@ -315,7 +321,7 @@
           <a:p>
             <a:fld id="{9E34EFD7-1B67-47E8-8296-5961268540E7}" type="datetimeFigureOut">
               <a:rPr lang="es-AR" smtClean="0"/>
-              <a:t>23/2/2023</a:t>
+              <a:t>24/2/2023</a:t>
             </a:fld>
             <a:endParaRPr lang="es-AR"/>
           </a:p>
@@ -536,7 +542,7 @@
           <a:p>
             <a:fld id="{9E34EFD7-1B67-47E8-8296-5961268540E7}" type="datetimeFigureOut">
               <a:rPr lang="es-AR" smtClean="0"/>
-              <a:t>23/2/2023</a:t>
+              <a:t>24/2/2023</a:t>
             </a:fld>
             <a:endParaRPr lang="es-AR"/>
           </a:p>
@@ -716,7 +722,7 @@
           <a:p>
             <a:fld id="{9E34EFD7-1B67-47E8-8296-5961268540E7}" type="datetimeFigureOut">
               <a:rPr lang="es-AR" smtClean="0"/>
-              <a:t>23/2/2023</a:t>
+              <a:t>24/2/2023</a:t>
             </a:fld>
             <a:endParaRPr lang="es-AR"/>
           </a:p>
@@ -886,7 +892,7 @@
           <a:p>
             <a:fld id="{9E34EFD7-1B67-47E8-8296-5961268540E7}" type="datetimeFigureOut">
               <a:rPr lang="es-AR" smtClean="0"/>
-              <a:t>23/2/2023</a:t>
+              <a:t>24/2/2023</a:t>
             </a:fld>
             <a:endParaRPr lang="es-AR"/>
           </a:p>
@@ -1137,7 +1143,7 @@
           <a:p>
             <a:fld id="{9E34EFD7-1B67-47E8-8296-5961268540E7}" type="datetimeFigureOut">
               <a:rPr lang="es-AR" smtClean="0"/>
-              <a:t>23/2/2023</a:t>
+              <a:t>24/2/2023</a:t>
             </a:fld>
             <a:endParaRPr lang="es-AR"/>
           </a:p>
@@ -1460,7 +1466,7 @@
           <a:p>
             <a:fld id="{9E34EFD7-1B67-47E8-8296-5961268540E7}" type="datetimeFigureOut">
               <a:rPr lang="es-AR" smtClean="0"/>
-              <a:t>23/2/2023</a:t>
+              <a:t>24/2/2023</a:t>
             </a:fld>
             <a:endParaRPr lang="es-AR"/>
           </a:p>
@@ -1884,7 +1890,7 @@
           <a:p>
             <a:fld id="{9E34EFD7-1B67-47E8-8296-5961268540E7}" type="datetimeFigureOut">
               <a:rPr lang="es-AR" smtClean="0"/>
-              <a:t>23/2/2023</a:t>
+              <a:t>24/2/2023</a:t>
             </a:fld>
             <a:endParaRPr lang="es-AR"/>
           </a:p>
@@ -2002,7 +2008,7 @@
           <a:p>
             <a:fld id="{9E34EFD7-1B67-47E8-8296-5961268540E7}" type="datetimeFigureOut">
               <a:rPr lang="es-AR" smtClean="0"/>
-              <a:t>23/2/2023</a:t>
+              <a:t>24/2/2023</a:t>
             </a:fld>
             <a:endParaRPr lang="es-AR"/>
           </a:p>
@@ -2097,7 +2103,7 @@
           <a:p>
             <a:fld id="{9E34EFD7-1B67-47E8-8296-5961268540E7}" type="datetimeFigureOut">
               <a:rPr lang="es-AR" smtClean="0"/>
-              <a:t>23/2/2023</a:t>
+              <a:t>24/2/2023</a:t>
             </a:fld>
             <a:endParaRPr lang="es-AR"/>
           </a:p>
@@ -2387,7 +2393,7 @@
           <a:p>
             <a:fld id="{9E34EFD7-1B67-47E8-8296-5961268540E7}" type="datetimeFigureOut">
               <a:rPr lang="es-AR" smtClean="0"/>
-              <a:t>23/2/2023</a:t>
+              <a:t>24/2/2023</a:t>
             </a:fld>
             <a:endParaRPr lang="es-AR"/>
           </a:p>
@@ -2659,7 +2665,7 @@
           <a:p>
             <a:fld id="{9E34EFD7-1B67-47E8-8296-5961268540E7}" type="datetimeFigureOut">
               <a:rPr lang="es-AR" smtClean="0"/>
-              <a:t>23/2/2023</a:t>
+              <a:t>24/2/2023</a:t>
             </a:fld>
             <a:endParaRPr lang="es-AR"/>
           </a:p>
@@ -2913,7 +2919,7 @@
           <a:p>
             <a:fld id="{9E34EFD7-1B67-47E8-8296-5961268540E7}" type="datetimeFigureOut">
               <a:rPr lang="es-AR" smtClean="0"/>
-              <a:t>23/2/2023</a:t>
+              <a:t>24/2/2023</a:t>
             </a:fld>
             <a:endParaRPr lang="es-AR"/>
           </a:p>
@@ -3443,6 +3449,686 @@
 </p:sld>
 </file>
 
+<file path=ppt/slides/slide10.xml><?xml version="1.0" encoding="utf-8"?>
+<p:sld xmlns:a="http://schemas.openxmlformats.org/drawingml/2006/main" xmlns:r="http://schemas.openxmlformats.org/officeDocument/2006/relationships" xmlns:p="http://schemas.openxmlformats.org/presentationml/2006/main">
+  <p:cSld>
+    <p:spTree>
+      <p:nvGrpSpPr>
+        <p:cNvPr id="1" name=""/>
+        <p:cNvGrpSpPr/>
+        <p:nvPr/>
+      </p:nvGrpSpPr>
+      <p:grpSpPr>
+        <a:xfrm>
+          <a:off x="0" y="0"/>
+          <a:ext cx="0" cy="0"/>
+          <a:chOff x="0" y="0"/>
+          <a:chExt cx="0" cy="0"/>
+        </a:xfrm>
+      </p:grpSpPr>
+      <p:sp>
+        <p:nvSpPr>
+          <p:cNvPr id="2" name="Título 1">
+            <a:extLst>
+              <a:ext uri="{FF2B5EF4-FFF2-40B4-BE49-F238E27FC236}">
+                <a16:creationId xmlns:a16="http://schemas.microsoft.com/office/drawing/2014/main" id="{83507DB9-2627-9C5E-FFDC-298F92CA51B5}"/>
+              </a:ext>
+            </a:extLst>
+          </p:cNvPr>
+          <p:cNvSpPr>
+            <a:spLocks noGrp="1"/>
+          </p:cNvSpPr>
+          <p:nvPr>
+            <p:ph type="title"/>
+          </p:nvPr>
+        </p:nvSpPr>
+        <p:spPr>
+          <a:xfrm>
+            <a:off x="1073331" y="391887"/>
+            <a:ext cx="9875520" cy="1356360"/>
+          </a:xfrm>
+        </p:spPr>
+        <p:txBody>
+          <a:bodyPr>
+            <a:normAutofit fontScale="90000"/>
+          </a:bodyPr>
+          <a:lstStyle/>
+          <a:p>
+            <a:pPr algn="ctr"/>
+            <a:r>
+              <a:rPr lang="es-AR" sz="4000" b="1" dirty="0"/>
+              <a:t>Desafío 14</a:t>
+            </a:r>
+            <a:br>
+              <a:rPr lang="es-AR" sz="4000" b="1" dirty="0"/>
+            </a:br>
+            <a:r>
+              <a:rPr lang="es-AR" sz="2000" b="1" dirty="0"/>
+              <a:t>XGBoost</a:t>
+            </a:r>
+            <a:br>
+              <a:rPr lang="es-AR" sz="6000" dirty="0"/>
+            </a:br>
+            <a:endParaRPr lang="es-AR" dirty="0"/>
+          </a:p>
+        </p:txBody>
+      </p:sp>
+      <p:pic>
+        <p:nvPicPr>
+          <p:cNvPr id="6" name="Marcador de contenido 5">
+            <a:extLst>
+              <a:ext uri="{FF2B5EF4-FFF2-40B4-BE49-F238E27FC236}">
+                <a16:creationId xmlns:a16="http://schemas.microsoft.com/office/drawing/2014/main" id="{6D92069B-952F-23F0-0DFA-D34B87B5E90C}"/>
+              </a:ext>
+            </a:extLst>
+          </p:cNvPr>
+          <p:cNvPicPr>
+            <a:picLocks noGrp="1" noChangeAspect="1"/>
+          </p:cNvPicPr>
+          <p:nvPr>
+            <p:ph idx="1"/>
+          </p:nvPr>
+        </p:nvPicPr>
+        <p:blipFill>
+          <a:blip r:embed="rId2"/>
+          <a:stretch>
+            <a:fillRect/>
+          </a:stretch>
+        </p:blipFill>
+        <p:spPr>
+          <a:xfrm>
+            <a:off x="6505542" y="2055223"/>
+            <a:ext cx="5077600" cy="3805962"/>
+          </a:xfrm>
+        </p:spPr>
+      </p:pic>
+      <p:pic>
+        <p:nvPicPr>
+          <p:cNvPr id="9" name="Imagen 8">
+            <a:extLst>
+              <a:ext uri="{FF2B5EF4-FFF2-40B4-BE49-F238E27FC236}">
+                <a16:creationId xmlns:a16="http://schemas.microsoft.com/office/drawing/2014/main" id="{0752C013-A551-D988-9846-52058C1B6DF8}"/>
+              </a:ext>
+            </a:extLst>
+          </p:cNvPr>
+          <p:cNvPicPr>
+            <a:picLocks noChangeAspect="1"/>
+          </p:cNvPicPr>
+          <p:nvPr/>
+        </p:nvPicPr>
+        <p:blipFill>
+          <a:blip r:embed="rId3"/>
+          <a:stretch>
+            <a:fillRect/>
+          </a:stretch>
+        </p:blipFill>
+        <p:spPr>
+          <a:xfrm>
+            <a:off x="414214" y="2055222"/>
+            <a:ext cx="5403112" cy="3623263"/>
+          </a:xfrm>
+          <a:prstGeom prst="rect">
+            <a:avLst/>
+          </a:prstGeom>
+        </p:spPr>
+      </p:pic>
+    </p:spTree>
+    <p:extLst>
+      <p:ext uri="{BB962C8B-B14F-4D97-AF65-F5344CB8AC3E}">
+        <p14:creationId xmlns:p14="http://schemas.microsoft.com/office/powerpoint/2010/main" val="272417449"/>
+      </p:ext>
+    </p:extLst>
+  </p:cSld>
+  <p:clrMapOvr>
+    <a:masterClrMapping/>
+  </p:clrMapOvr>
+</p:sld>
+</file>
+
+<file path=ppt/slides/slide11.xml><?xml version="1.0" encoding="utf-8"?>
+<p:sld xmlns:a="http://schemas.openxmlformats.org/drawingml/2006/main" xmlns:r="http://schemas.openxmlformats.org/officeDocument/2006/relationships" xmlns:p="http://schemas.openxmlformats.org/presentationml/2006/main">
+  <p:cSld>
+    <p:spTree>
+      <p:nvGrpSpPr>
+        <p:cNvPr id="1" name=""/>
+        <p:cNvGrpSpPr/>
+        <p:nvPr/>
+      </p:nvGrpSpPr>
+      <p:grpSpPr>
+        <a:xfrm>
+          <a:off x="0" y="0"/>
+          <a:ext cx="0" cy="0"/>
+          <a:chOff x="0" y="0"/>
+          <a:chExt cx="0" cy="0"/>
+        </a:xfrm>
+      </p:grpSpPr>
+      <p:sp>
+        <p:nvSpPr>
+          <p:cNvPr id="2" name="Título 1">
+            <a:extLst>
+              <a:ext uri="{FF2B5EF4-FFF2-40B4-BE49-F238E27FC236}">
+                <a16:creationId xmlns:a16="http://schemas.microsoft.com/office/drawing/2014/main" id="{83507DB9-2627-9C5E-FFDC-298F92CA51B5}"/>
+              </a:ext>
+            </a:extLst>
+          </p:cNvPr>
+          <p:cNvSpPr>
+            <a:spLocks noGrp="1"/>
+          </p:cNvSpPr>
+          <p:nvPr>
+            <p:ph type="title"/>
+          </p:nvPr>
+        </p:nvSpPr>
+        <p:spPr>
+          <a:xfrm>
+            <a:off x="1073331" y="391887"/>
+            <a:ext cx="9875520" cy="1356360"/>
+          </a:xfrm>
+        </p:spPr>
+        <p:txBody>
+          <a:bodyPr>
+            <a:normAutofit fontScale="90000"/>
+          </a:bodyPr>
+          <a:lstStyle/>
+          <a:p>
+            <a:pPr algn="ctr"/>
+            <a:r>
+              <a:rPr lang="es-AR" sz="4000" b="1" dirty="0"/>
+              <a:t>Desafío 15</a:t>
+            </a:r>
+            <a:br>
+              <a:rPr lang="es-AR" sz="4000" b="1" dirty="0"/>
+            </a:br>
+            <a:r>
+              <a:rPr lang="es-AR" sz="2000" b="1" dirty="0"/>
+              <a:t>XGBoost</a:t>
+            </a:r>
+            <a:br>
+              <a:rPr lang="es-AR" sz="6000" dirty="0"/>
+            </a:br>
+            <a:endParaRPr lang="es-AR" dirty="0"/>
+          </a:p>
+        </p:txBody>
+      </p:sp>
+      <p:pic>
+        <p:nvPicPr>
+          <p:cNvPr id="4" name="Imagen 3">
+            <a:extLst>
+              <a:ext uri="{FF2B5EF4-FFF2-40B4-BE49-F238E27FC236}">
+                <a16:creationId xmlns:a16="http://schemas.microsoft.com/office/drawing/2014/main" id="{72580A31-A40F-62A8-CEC9-36C46A190125}"/>
+              </a:ext>
+            </a:extLst>
+          </p:cNvPr>
+          <p:cNvPicPr>
+            <a:picLocks noChangeAspect="1"/>
+          </p:cNvPicPr>
+          <p:nvPr/>
+        </p:nvPicPr>
+        <p:blipFill>
+          <a:blip r:embed="rId2"/>
+          <a:stretch>
+            <a:fillRect/>
+          </a:stretch>
+        </p:blipFill>
+        <p:spPr>
+          <a:xfrm>
+            <a:off x="419954" y="2066241"/>
+            <a:ext cx="5363273" cy="3679241"/>
+          </a:xfrm>
+          <a:prstGeom prst="rect">
+            <a:avLst/>
+          </a:prstGeom>
+        </p:spPr>
+      </p:pic>
+      <p:pic>
+        <p:nvPicPr>
+          <p:cNvPr id="9" name="Marcador de contenido 8">
+            <a:extLst>
+              <a:ext uri="{FF2B5EF4-FFF2-40B4-BE49-F238E27FC236}">
+                <a16:creationId xmlns:a16="http://schemas.microsoft.com/office/drawing/2014/main" id="{CCADD1C8-BE7E-E8F2-B48D-9AF2F9AB7B9C}"/>
+              </a:ext>
+            </a:extLst>
+          </p:cNvPr>
+          <p:cNvPicPr>
+            <a:picLocks noGrp="1" noChangeAspect="1"/>
+          </p:cNvPicPr>
+          <p:nvPr>
+            <p:ph idx="1"/>
+          </p:nvPr>
+        </p:nvPicPr>
+        <p:blipFill>
+          <a:blip r:embed="rId3"/>
+          <a:stretch>
+            <a:fillRect/>
+          </a:stretch>
+        </p:blipFill>
+        <p:spPr>
+          <a:xfrm>
+            <a:off x="6313298" y="2066241"/>
+            <a:ext cx="5201609" cy="3864576"/>
+          </a:xfrm>
+        </p:spPr>
+      </p:pic>
+    </p:spTree>
+    <p:extLst>
+      <p:ext uri="{BB962C8B-B14F-4D97-AF65-F5344CB8AC3E}">
+        <p14:creationId xmlns:p14="http://schemas.microsoft.com/office/powerpoint/2010/main" val="3355291556"/>
+      </p:ext>
+    </p:extLst>
+  </p:cSld>
+  <p:clrMapOvr>
+    <a:masterClrMapping/>
+  </p:clrMapOvr>
+</p:sld>
+</file>
+
+<file path=ppt/slides/slide12.xml><?xml version="1.0" encoding="utf-8"?>
+<p:sld xmlns:a="http://schemas.openxmlformats.org/drawingml/2006/main" xmlns:r="http://schemas.openxmlformats.org/officeDocument/2006/relationships" xmlns:p="http://schemas.openxmlformats.org/presentationml/2006/main">
+  <p:cSld>
+    <p:spTree>
+      <p:nvGrpSpPr>
+        <p:cNvPr id="1" name=""/>
+        <p:cNvGrpSpPr/>
+        <p:nvPr/>
+      </p:nvGrpSpPr>
+      <p:grpSpPr>
+        <a:xfrm>
+          <a:off x="0" y="0"/>
+          <a:ext cx="0" cy="0"/>
+          <a:chOff x="0" y="0"/>
+          <a:chExt cx="0" cy="0"/>
+        </a:xfrm>
+      </p:grpSpPr>
+      <p:sp>
+        <p:nvSpPr>
+          <p:cNvPr id="2" name="Título 1">
+            <a:extLst>
+              <a:ext uri="{FF2B5EF4-FFF2-40B4-BE49-F238E27FC236}">
+                <a16:creationId xmlns:a16="http://schemas.microsoft.com/office/drawing/2014/main" id="{83507DB9-2627-9C5E-FFDC-298F92CA51B5}"/>
+              </a:ext>
+            </a:extLst>
+          </p:cNvPr>
+          <p:cNvSpPr>
+            <a:spLocks noGrp="1"/>
+          </p:cNvSpPr>
+          <p:nvPr>
+            <p:ph type="title"/>
+          </p:nvPr>
+        </p:nvSpPr>
+        <p:spPr>
+          <a:xfrm>
+            <a:off x="1073331" y="391887"/>
+            <a:ext cx="9875520" cy="1356360"/>
+          </a:xfrm>
+        </p:spPr>
+        <p:txBody>
+          <a:bodyPr>
+            <a:normAutofit fontScale="90000"/>
+          </a:bodyPr>
+          <a:lstStyle/>
+          <a:p>
+            <a:pPr algn="ctr"/>
+            <a:r>
+              <a:rPr lang="es-AR" sz="4000" b="1" dirty="0"/>
+              <a:t>Desafío 16</a:t>
+            </a:r>
+            <a:br>
+              <a:rPr lang="es-AR" sz="4000" b="1" dirty="0"/>
+            </a:br>
+            <a:r>
+              <a:rPr lang="es-AR" sz="2000" b="1" dirty="0"/>
+              <a:t>XGBoost</a:t>
+            </a:r>
+            <a:br>
+              <a:rPr lang="es-AR" sz="6000" dirty="0"/>
+            </a:br>
+            <a:endParaRPr lang="es-AR" dirty="0"/>
+          </a:p>
+        </p:txBody>
+      </p:sp>
+      <p:pic>
+        <p:nvPicPr>
+          <p:cNvPr id="7" name="Imagen 6">
+            <a:extLst>
+              <a:ext uri="{FF2B5EF4-FFF2-40B4-BE49-F238E27FC236}">
+                <a16:creationId xmlns:a16="http://schemas.microsoft.com/office/drawing/2014/main" id="{E83281FA-5863-CCC5-930D-0DE740E5CC37}"/>
+              </a:ext>
+            </a:extLst>
+          </p:cNvPr>
+          <p:cNvPicPr>
+            <a:picLocks noChangeAspect="1"/>
+          </p:cNvPicPr>
+          <p:nvPr/>
+        </p:nvPicPr>
+        <p:blipFill>
+          <a:blip r:embed="rId2"/>
+          <a:stretch>
+            <a:fillRect/>
+          </a:stretch>
+        </p:blipFill>
+        <p:spPr>
+          <a:xfrm>
+            <a:off x="357911" y="1985554"/>
+            <a:ext cx="5504345" cy="3709854"/>
+          </a:xfrm>
+          <a:prstGeom prst="rect">
+            <a:avLst/>
+          </a:prstGeom>
+        </p:spPr>
+      </p:pic>
+      <p:pic>
+        <p:nvPicPr>
+          <p:cNvPr id="12" name="Marcador de contenido 11">
+            <a:extLst>
+              <a:ext uri="{FF2B5EF4-FFF2-40B4-BE49-F238E27FC236}">
+                <a16:creationId xmlns:a16="http://schemas.microsoft.com/office/drawing/2014/main" id="{2EBBA60B-FB01-E46B-909F-F7317F2ED099}"/>
+              </a:ext>
+            </a:extLst>
+          </p:cNvPr>
+          <p:cNvPicPr>
+            <a:picLocks noGrp="1" noChangeAspect="1"/>
+          </p:cNvPicPr>
+          <p:nvPr>
+            <p:ph idx="1"/>
+          </p:nvPr>
+        </p:nvPicPr>
+        <p:blipFill>
+          <a:blip r:embed="rId3"/>
+          <a:stretch>
+            <a:fillRect/>
+          </a:stretch>
+        </p:blipFill>
+        <p:spPr>
+          <a:xfrm>
+            <a:off x="6329745" y="1985554"/>
+            <a:ext cx="5201566" cy="3873702"/>
+          </a:xfrm>
+        </p:spPr>
+      </p:pic>
+    </p:spTree>
+    <p:extLst>
+      <p:ext uri="{BB962C8B-B14F-4D97-AF65-F5344CB8AC3E}">
+        <p14:creationId xmlns:p14="http://schemas.microsoft.com/office/powerpoint/2010/main" val="840156501"/>
+      </p:ext>
+    </p:extLst>
+  </p:cSld>
+  <p:clrMapOvr>
+    <a:masterClrMapping/>
+  </p:clrMapOvr>
+</p:sld>
+</file>
+
+<file path=ppt/slides/slide13.xml><?xml version="1.0" encoding="utf-8"?>
+<p:sld xmlns:a="http://schemas.openxmlformats.org/drawingml/2006/main" xmlns:r="http://schemas.openxmlformats.org/officeDocument/2006/relationships" xmlns:p="http://schemas.openxmlformats.org/presentationml/2006/main">
+  <p:cSld>
+    <p:spTree>
+      <p:nvGrpSpPr>
+        <p:cNvPr id="1" name=""/>
+        <p:cNvGrpSpPr/>
+        <p:nvPr/>
+      </p:nvGrpSpPr>
+      <p:grpSpPr>
+        <a:xfrm>
+          <a:off x="0" y="0"/>
+          <a:ext cx="0" cy="0"/>
+          <a:chOff x="0" y="0"/>
+          <a:chExt cx="0" cy="0"/>
+        </a:xfrm>
+      </p:grpSpPr>
+      <p:sp>
+        <p:nvSpPr>
+          <p:cNvPr id="2" name="Título 1">
+            <a:extLst>
+              <a:ext uri="{FF2B5EF4-FFF2-40B4-BE49-F238E27FC236}">
+                <a16:creationId xmlns:a16="http://schemas.microsoft.com/office/drawing/2014/main" id="{83507DB9-2627-9C5E-FFDC-298F92CA51B5}"/>
+              </a:ext>
+            </a:extLst>
+          </p:cNvPr>
+          <p:cNvSpPr>
+            <a:spLocks noGrp="1"/>
+          </p:cNvSpPr>
+          <p:nvPr>
+            <p:ph type="title"/>
+          </p:nvPr>
+        </p:nvSpPr>
+        <p:spPr>
+          <a:xfrm>
+            <a:off x="1073331" y="391887"/>
+            <a:ext cx="9875520" cy="1356360"/>
+          </a:xfrm>
+        </p:spPr>
+        <p:txBody>
+          <a:bodyPr>
+            <a:normAutofit fontScale="90000"/>
+          </a:bodyPr>
+          <a:lstStyle/>
+          <a:p>
+            <a:pPr algn="ctr"/>
+            <a:r>
+              <a:rPr lang="es-AR" sz="4000" b="1" dirty="0"/>
+              <a:t>Desafío 17</a:t>
+            </a:r>
+            <a:br>
+              <a:rPr lang="es-AR" sz="4000" b="1" dirty="0"/>
+            </a:br>
+            <a:r>
+              <a:rPr lang="es-AR" sz="2000" b="1" dirty="0"/>
+              <a:t>XGBoost</a:t>
+            </a:r>
+            <a:br>
+              <a:rPr lang="es-AR" sz="6000" dirty="0"/>
+            </a:br>
+            <a:endParaRPr lang="es-AR" dirty="0"/>
+          </a:p>
+        </p:txBody>
+      </p:sp>
+      <p:pic>
+        <p:nvPicPr>
+          <p:cNvPr id="8" name="Marcador de contenido 7">
+            <a:extLst>
+              <a:ext uri="{FF2B5EF4-FFF2-40B4-BE49-F238E27FC236}">
+                <a16:creationId xmlns:a16="http://schemas.microsoft.com/office/drawing/2014/main" id="{AB679C75-5ED9-FA7B-BE70-6AD0BA8E433A}"/>
+              </a:ext>
+            </a:extLst>
+          </p:cNvPr>
+          <p:cNvPicPr>
+            <a:picLocks noGrp="1" noChangeAspect="1"/>
+          </p:cNvPicPr>
+          <p:nvPr>
+            <p:ph idx="1"/>
+          </p:nvPr>
+        </p:nvPicPr>
+        <p:blipFill>
+          <a:blip r:embed="rId2"/>
+          <a:stretch>
+            <a:fillRect/>
+          </a:stretch>
+        </p:blipFill>
+        <p:spPr>
+          <a:xfrm>
+            <a:off x="6141422" y="2106802"/>
+            <a:ext cx="5218049" cy="3902114"/>
+          </a:xfrm>
+        </p:spPr>
+      </p:pic>
+      <p:pic>
+        <p:nvPicPr>
+          <p:cNvPr id="11" name="Imagen 10">
+            <a:extLst>
+              <a:ext uri="{FF2B5EF4-FFF2-40B4-BE49-F238E27FC236}">
+                <a16:creationId xmlns:a16="http://schemas.microsoft.com/office/drawing/2014/main" id="{AE4EBEFB-4349-77D0-5D22-CC4CE15F3F60}"/>
+              </a:ext>
+            </a:extLst>
+          </p:cNvPr>
+          <p:cNvPicPr>
+            <a:picLocks noChangeAspect="1"/>
+          </p:cNvPicPr>
+          <p:nvPr/>
+        </p:nvPicPr>
+        <p:blipFill>
+          <a:blip r:embed="rId3"/>
+          <a:stretch>
+            <a:fillRect/>
+          </a:stretch>
+        </p:blipFill>
+        <p:spPr>
+          <a:xfrm>
+            <a:off x="339488" y="2091661"/>
+            <a:ext cx="5486546" cy="3682123"/>
+          </a:xfrm>
+          <a:prstGeom prst="rect">
+            <a:avLst/>
+          </a:prstGeom>
+        </p:spPr>
+      </p:pic>
+    </p:spTree>
+    <p:extLst>
+      <p:ext uri="{BB962C8B-B14F-4D97-AF65-F5344CB8AC3E}">
+        <p14:creationId xmlns:p14="http://schemas.microsoft.com/office/powerpoint/2010/main" val="3648487909"/>
+      </p:ext>
+    </p:extLst>
+  </p:cSld>
+  <p:clrMapOvr>
+    <a:masterClrMapping/>
+  </p:clrMapOvr>
+</p:sld>
+</file>
+
+<file path=ppt/slides/slide14.xml><?xml version="1.0" encoding="utf-8"?>
+<p:sld xmlns:a="http://schemas.openxmlformats.org/drawingml/2006/main" xmlns:r="http://schemas.openxmlformats.org/officeDocument/2006/relationships" xmlns:p="http://schemas.openxmlformats.org/presentationml/2006/main">
+  <p:cSld>
+    <p:spTree>
+      <p:nvGrpSpPr>
+        <p:cNvPr id="1" name=""/>
+        <p:cNvGrpSpPr/>
+        <p:nvPr/>
+      </p:nvGrpSpPr>
+      <p:grpSpPr>
+        <a:xfrm>
+          <a:off x="0" y="0"/>
+          <a:ext cx="0" cy="0"/>
+          <a:chOff x="0" y="0"/>
+          <a:chExt cx="0" cy="0"/>
+        </a:xfrm>
+      </p:grpSpPr>
+      <p:sp>
+        <p:nvSpPr>
+          <p:cNvPr id="2" name="Título 1">
+            <a:extLst>
+              <a:ext uri="{FF2B5EF4-FFF2-40B4-BE49-F238E27FC236}">
+                <a16:creationId xmlns:a16="http://schemas.microsoft.com/office/drawing/2014/main" id="{83507DB9-2627-9C5E-FFDC-298F92CA51B5}"/>
+              </a:ext>
+            </a:extLst>
+          </p:cNvPr>
+          <p:cNvSpPr>
+            <a:spLocks noGrp="1"/>
+          </p:cNvSpPr>
+          <p:nvPr>
+            <p:ph type="title"/>
+          </p:nvPr>
+        </p:nvSpPr>
+        <p:spPr>
+          <a:xfrm>
+            <a:off x="1073331" y="391887"/>
+            <a:ext cx="9875520" cy="1356360"/>
+          </a:xfrm>
+        </p:spPr>
+        <p:txBody>
+          <a:bodyPr>
+            <a:normAutofit fontScale="90000"/>
+          </a:bodyPr>
+          <a:lstStyle/>
+          <a:p>
+            <a:pPr algn="ctr"/>
+            <a:r>
+              <a:rPr lang="es-AR" sz="4000" b="1" dirty="0"/>
+              <a:t>Desafío 18</a:t>
+            </a:r>
+            <a:br>
+              <a:rPr lang="es-AR" sz="4000" b="1" dirty="0"/>
+            </a:br>
+            <a:r>
+              <a:rPr lang="es-AR" sz="2000" b="1" dirty="0"/>
+              <a:t>XGBoost</a:t>
+            </a:r>
+            <a:br>
+              <a:rPr lang="es-AR" sz="6000" dirty="0"/>
+            </a:br>
+            <a:endParaRPr lang="es-AR" dirty="0"/>
+          </a:p>
+        </p:txBody>
+      </p:sp>
+      <p:pic>
+        <p:nvPicPr>
+          <p:cNvPr id="7" name="Marcador de contenido 6">
+            <a:extLst>
+              <a:ext uri="{FF2B5EF4-FFF2-40B4-BE49-F238E27FC236}">
+                <a16:creationId xmlns:a16="http://schemas.microsoft.com/office/drawing/2014/main" id="{414B3D54-FED6-D3A1-104D-EA18B9D5E03F}"/>
+              </a:ext>
+            </a:extLst>
+          </p:cNvPr>
+          <p:cNvPicPr>
+            <a:picLocks noGrp="1" noChangeAspect="1"/>
+          </p:cNvPicPr>
+          <p:nvPr>
+            <p:ph idx="1"/>
+          </p:nvPr>
+        </p:nvPicPr>
+        <p:blipFill>
+          <a:blip r:embed="rId2"/>
+          <a:stretch>
+            <a:fillRect/>
+          </a:stretch>
+        </p:blipFill>
+        <p:spPr>
+          <a:xfrm>
+            <a:off x="6217772" y="1878878"/>
+            <a:ext cx="5477691" cy="4098625"/>
+          </a:xfrm>
+        </p:spPr>
+      </p:pic>
+      <p:pic>
+        <p:nvPicPr>
+          <p:cNvPr id="10" name="Imagen 9">
+            <a:extLst>
+              <a:ext uri="{FF2B5EF4-FFF2-40B4-BE49-F238E27FC236}">
+                <a16:creationId xmlns:a16="http://schemas.microsoft.com/office/drawing/2014/main" id="{C0DA9BA7-009A-88B0-3FB2-4A0F90878733}"/>
+              </a:ext>
+            </a:extLst>
+          </p:cNvPr>
+          <p:cNvPicPr>
+            <a:picLocks noChangeAspect="1"/>
+          </p:cNvPicPr>
+          <p:nvPr/>
+        </p:nvPicPr>
+        <p:blipFill>
+          <a:blip r:embed="rId3"/>
+          <a:stretch>
+            <a:fillRect/>
+          </a:stretch>
+        </p:blipFill>
+        <p:spPr>
+          <a:xfrm>
+            <a:off x="296092" y="1878878"/>
+            <a:ext cx="5732140" cy="3886197"/>
+          </a:xfrm>
+          <a:prstGeom prst="rect">
+            <a:avLst/>
+          </a:prstGeom>
+        </p:spPr>
+      </p:pic>
+    </p:spTree>
+    <p:extLst>
+      <p:ext uri="{BB962C8B-B14F-4D97-AF65-F5344CB8AC3E}">
+        <p14:creationId xmlns:p14="http://schemas.microsoft.com/office/powerpoint/2010/main" val="3142758677"/>
+      </p:ext>
+    </p:extLst>
+  </p:cSld>
+  <p:clrMapOvr>
+    <a:masterClrMapping/>
+  </p:clrMapOvr>
+</p:sld>
+</file>
+
 <file path=ppt/slides/slide2.xml><?xml version="1.0" encoding="utf-8"?>
 <p:sld xmlns:a="http://schemas.openxmlformats.org/drawingml/2006/main" xmlns:r="http://schemas.openxmlformats.org/officeDocument/2006/relationships" xmlns:p="http://schemas.openxmlformats.org/presentationml/2006/main">
   <p:cSld>
@@ -4070,8 +4756,44 @@
         </p:blipFill>
         <p:spPr>
           <a:xfrm>
-            <a:off x="4224338" y="1652587"/>
-            <a:ext cx="6486525" cy="4848225"/>
+            <a:off x="5493654" y="1487124"/>
+            <a:ext cx="6370194" cy="4761276"/>
+          </a:xfrm>
+          <a:prstGeom prst="rect">
+            <a:avLst/>
+          </a:prstGeom>
+        </p:spPr>
+      </p:pic>
+      <p:pic>
+        <p:nvPicPr>
+          <p:cNvPr id="5" name="Imagen 4">
+            <a:extLst>
+              <a:ext uri="{FF2B5EF4-FFF2-40B4-BE49-F238E27FC236}">
+                <a16:creationId xmlns:a16="http://schemas.microsoft.com/office/drawing/2014/main" id="{3E6DABB7-2840-BC9D-70D9-B52CBA2CE65C}"/>
+              </a:ext>
+            </a:extLst>
+          </p:cNvPr>
+          <p:cNvPicPr>
+            <a:picLocks noChangeAspect="1"/>
+          </p:cNvPicPr>
+          <p:nvPr/>
+        </p:nvPicPr>
+        <p:blipFill>
+          <a:blip r:embed="rId3">
+            <a:extLst>
+              <a:ext uri="{28A0092B-C50C-407E-A947-70E740481C1C}">
+                <a14:useLocalDpi xmlns:a14="http://schemas.microsoft.com/office/drawing/2010/main" val="0"/>
+              </a:ext>
+            </a:extLst>
+          </a:blip>
+          <a:stretch>
+            <a:fillRect/>
+          </a:stretch>
+        </p:blipFill>
+        <p:spPr>
+          <a:xfrm>
+            <a:off x="496389" y="2266405"/>
+            <a:ext cx="4549124" cy="3141618"/>
           </a:xfrm>
           <a:prstGeom prst="rect">
             <a:avLst/>
@@ -4288,8 +5010,38 @@
         </p:blipFill>
         <p:spPr>
           <a:xfrm>
-            <a:off x="4410967" y="1604717"/>
-            <a:ext cx="6604904" cy="4943965"/>
+            <a:off x="5660571" y="1559233"/>
+            <a:ext cx="6060907" cy="4536767"/>
+          </a:xfrm>
+          <a:prstGeom prst="rect">
+            <a:avLst/>
+          </a:prstGeom>
+        </p:spPr>
+      </p:pic>
+      <p:pic>
+        <p:nvPicPr>
+          <p:cNvPr id="6" name="Imagen 5">
+            <a:extLst>
+              <a:ext uri="{FF2B5EF4-FFF2-40B4-BE49-F238E27FC236}">
+                <a16:creationId xmlns:a16="http://schemas.microsoft.com/office/drawing/2014/main" id="{F045F4A6-A749-3599-B37B-A87AFF39F12B}"/>
+              </a:ext>
+            </a:extLst>
+          </p:cNvPr>
+          <p:cNvPicPr>
+            <a:picLocks noChangeAspect="1"/>
+          </p:cNvPicPr>
+          <p:nvPr/>
+        </p:nvPicPr>
+        <p:blipFill>
+          <a:blip r:embed="rId3"/>
+          <a:stretch>
+            <a:fillRect/>
+          </a:stretch>
+        </p:blipFill>
+        <p:spPr>
+          <a:xfrm>
+            <a:off x="559744" y="2302288"/>
+            <a:ext cx="4455983" cy="3096140"/>
           </a:xfrm>
           <a:prstGeom prst="rect">
             <a:avLst/>
@@ -4310,223 +5062,6 @@
 </file>
 
 <file path=ppt/slides/slide7.xml><?xml version="1.0" encoding="utf-8"?>
-<p:sld xmlns:a="http://schemas.openxmlformats.org/drawingml/2006/main" xmlns:r="http://schemas.openxmlformats.org/officeDocument/2006/relationships" xmlns:p="http://schemas.openxmlformats.org/presentationml/2006/main">
-  <p:cSld>
-    <p:spTree>
-      <p:nvGrpSpPr>
-        <p:cNvPr id="1" name=""/>
-        <p:cNvGrpSpPr/>
-        <p:nvPr/>
-      </p:nvGrpSpPr>
-      <p:grpSpPr>
-        <a:xfrm>
-          <a:off x="0" y="0"/>
-          <a:ext cx="0" cy="0"/>
-          <a:chOff x="0" y="0"/>
-          <a:chExt cx="0" cy="0"/>
-        </a:xfrm>
-      </p:grpSpPr>
-      <p:sp>
-        <p:nvSpPr>
-          <p:cNvPr id="2" name="Título 1">
-            <a:extLst>
-              <a:ext uri="{FF2B5EF4-FFF2-40B4-BE49-F238E27FC236}">
-                <a16:creationId xmlns:a16="http://schemas.microsoft.com/office/drawing/2014/main" id="{83507DB9-2627-9C5E-FFDC-298F92CA51B5}"/>
-              </a:ext>
-            </a:extLst>
-          </p:cNvPr>
-          <p:cNvSpPr>
-            <a:spLocks noGrp="1"/>
-          </p:cNvSpPr>
-          <p:nvPr>
-            <p:ph type="title"/>
-          </p:nvPr>
-        </p:nvSpPr>
-        <p:spPr>
-          <a:xfrm>
-            <a:off x="1083733" y="332792"/>
-            <a:ext cx="9875520" cy="1390227"/>
-          </a:xfrm>
-        </p:spPr>
-        <p:txBody>
-          <a:bodyPr>
-            <a:normAutofit fontScale="90000"/>
-          </a:bodyPr>
-          <a:lstStyle/>
-          <a:p>
-            <a:pPr algn="ctr"/>
-            <a:r>
-              <a:rPr lang="es-AR" sz="6000" b="1" dirty="0"/>
-              <a:t>XGBoost</a:t>
-            </a:r>
-            <a:br>
-              <a:rPr lang="es-AR" sz="6000" dirty="0"/>
-            </a:br>
-            <a:endParaRPr lang="es-AR" dirty="0"/>
-          </a:p>
-        </p:txBody>
-      </p:sp>
-      <p:pic>
-        <p:nvPicPr>
-          <p:cNvPr id="6" name="Marcador de contenido 5">
-            <a:extLst>
-              <a:ext uri="{FF2B5EF4-FFF2-40B4-BE49-F238E27FC236}">
-                <a16:creationId xmlns:a16="http://schemas.microsoft.com/office/drawing/2014/main" id="{64CE97AD-5577-689C-14C1-1722F535BBB6}"/>
-              </a:ext>
-            </a:extLst>
-          </p:cNvPr>
-          <p:cNvPicPr>
-            <a:picLocks noGrp="1" noChangeAspect="1"/>
-          </p:cNvPicPr>
-          <p:nvPr>
-            <p:ph idx="1"/>
-          </p:nvPr>
-        </p:nvPicPr>
-        <p:blipFill>
-          <a:blip r:embed="rId2"/>
-          <a:stretch>
-            <a:fillRect/>
-          </a:stretch>
-        </p:blipFill>
-        <p:spPr>
-          <a:xfrm>
-            <a:off x="5926510" y="1459719"/>
-            <a:ext cx="6091645" cy="4559829"/>
-          </a:xfrm>
-        </p:spPr>
-      </p:pic>
-      <p:pic>
-        <p:nvPicPr>
-          <p:cNvPr id="8" name="Imagen 7">
-            <a:extLst>
-              <a:ext uri="{FF2B5EF4-FFF2-40B4-BE49-F238E27FC236}">
-                <a16:creationId xmlns:a16="http://schemas.microsoft.com/office/drawing/2014/main" id="{96D97A46-6571-513B-8726-9D75ECB3C6EE}"/>
-              </a:ext>
-            </a:extLst>
-          </p:cNvPr>
-          <p:cNvPicPr>
-            <a:picLocks noChangeAspect="1"/>
-          </p:cNvPicPr>
-          <p:nvPr/>
-        </p:nvPicPr>
-        <p:blipFill>
-          <a:blip r:embed="rId3">
-            <a:extLst>
-              <a:ext uri="{28A0092B-C50C-407E-A947-70E740481C1C}">
-                <a14:useLocalDpi xmlns:a14="http://schemas.microsoft.com/office/drawing/2010/main" val="0"/>
-              </a:ext>
-            </a:extLst>
-          </a:blip>
-          <a:stretch>
-            <a:fillRect/>
-          </a:stretch>
-        </p:blipFill>
-        <p:spPr>
-          <a:xfrm>
-            <a:off x="86922" y="1470024"/>
-            <a:ext cx="6009078" cy="4559830"/>
-          </a:xfrm>
-          <a:prstGeom prst="rect">
-            <a:avLst/>
-          </a:prstGeom>
-        </p:spPr>
-      </p:pic>
-      <p:sp>
-        <p:nvSpPr>
-          <p:cNvPr id="9" name="CuadroTexto 8">
-            <a:extLst>
-              <a:ext uri="{FF2B5EF4-FFF2-40B4-BE49-F238E27FC236}">
-                <a16:creationId xmlns:a16="http://schemas.microsoft.com/office/drawing/2014/main" id="{FA7812FC-1165-5521-54B3-2978A5808758}"/>
-              </a:ext>
-            </a:extLst>
-          </p:cNvPr>
-          <p:cNvSpPr txBox="1"/>
-          <p:nvPr/>
-        </p:nvSpPr>
-        <p:spPr>
-          <a:xfrm>
-            <a:off x="2426828" y="1027906"/>
-            <a:ext cx="1781106" cy="369332"/>
-          </a:xfrm>
-          <a:prstGeom prst="rect">
-            <a:avLst/>
-          </a:prstGeom>
-          <a:noFill/>
-        </p:spPr>
-        <p:txBody>
-          <a:bodyPr wrap="square" rtlCol="0">
-            <a:spAutoFit/>
-          </a:bodyPr>
-          <a:lstStyle/>
-          <a:p>
-            <a:r>
-              <a:rPr lang="es-AR" b="1" dirty="0">
-                <a:solidFill>
-                  <a:schemeClr val="accent1">
-                    <a:lumMod val="75000"/>
-                  </a:schemeClr>
-                </a:solidFill>
-              </a:rPr>
-              <a:t>Desafío 14</a:t>
-            </a:r>
-          </a:p>
-        </p:txBody>
-      </p:sp>
-      <p:sp>
-        <p:nvSpPr>
-          <p:cNvPr id="10" name="CuadroTexto 9">
-            <a:extLst>
-              <a:ext uri="{FF2B5EF4-FFF2-40B4-BE49-F238E27FC236}">
-                <a16:creationId xmlns:a16="http://schemas.microsoft.com/office/drawing/2014/main" id="{5ADA07C2-1875-7FE5-40FB-1177118434A7}"/>
-              </a:ext>
-            </a:extLst>
-          </p:cNvPr>
-          <p:cNvSpPr txBox="1"/>
-          <p:nvPr/>
-        </p:nvSpPr>
-        <p:spPr>
-          <a:xfrm>
-            <a:off x="8822268" y="1027906"/>
-            <a:ext cx="1639426" cy="369332"/>
-          </a:xfrm>
-          <a:prstGeom prst="rect">
-            <a:avLst/>
-          </a:prstGeom>
-          <a:noFill/>
-        </p:spPr>
-        <p:txBody>
-          <a:bodyPr wrap="square" rtlCol="0">
-            <a:spAutoFit/>
-          </a:bodyPr>
-          <a:lstStyle/>
-          <a:p>
-            <a:r>
-              <a:rPr lang="es-AR" b="1" dirty="0">
-                <a:solidFill>
-                  <a:schemeClr val="accent1">
-                    <a:lumMod val="75000"/>
-                  </a:schemeClr>
-                </a:solidFill>
-              </a:rPr>
-              <a:t>Desafío 12</a:t>
-            </a:r>
-          </a:p>
-        </p:txBody>
-      </p:sp>
-    </p:spTree>
-    <p:extLst>
-      <p:ext uri="{BB962C8B-B14F-4D97-AF65-F5344CB8AC3E}">
-        <p14:creationId xmlns:p14="http://schemas.microsoft.com/office/powerpoint/2010/main" val="3080225922"/>
-      </p:ext>
-    </p:extLst>
-  </p:cSld>
-  <p:clrMapOvr>
-    <a:masterClrMapping/>
-  </p:clrMapOvr>
-</p:sld>
-</file>
-
-<file path=ppt/slides/slide8.xml><?xml version="1.0" encoding="utf-8"?>
 <p:sld xmlns:a="http://schemas.openxmlformats.org/drawingml/2006/main" xmlns:r="http://schemas.openxmlformats.org/officeDocument/2006/relationships" xmlns:p="http://schemas.openxmlformats.org/presentationml/2006/main">
   <p:cSld>
     <p:spTree>
@@ -4630,6 +5165,278 @@
     <p:extLst>
       <p:ext uri="{BB962C8B-B14F-4D97-AF65-F5344CB8AC3E}">
         <p14:creationId xmlns:p14="http://schemas.microsoft.com/office/powerpoint/2010/main" val="2711785801"/>
+      </p:ext>
+    </p:extLst>
+  </p:cSld>
+  <p:clrMapOvr>
+    <a:masterClrMapping/>
+  </p:clrMapOvr>
+</p:sld>
+</file>
+
+<file path=ppt/slides/slide8.xml><?xml version="1.0" encoding="utf-8"?>
+<p:sld xmlns:a="http://schemas.openxmlformats.org/drawingml/2006/main" xmlns:r="http://schemas.openxmlformats.org/officeDocument/2006/relationships" xmlns:p="http://schemas.openxmlformats.org/presentationml/2006/main">
+  <p:cSld>
+    <p:spTree>
+      <p:nvGrpSpPr>
+        <p:cNvPr id="1" name=""/>
+        <p:cNvGrpSpPr/>
+        <p:nvPr/>
+      </p:nvGrpSpPr>
+      <p:grpSpPr>
+        <a:xfrm>
+          <a:off x="0" y="0"/>
+          <a:ext cx="0" cy="0"/>
+          <a:chOff x="0" y="0"/>
+          <a:chExt cx="0" cy="0"/>
+        </a:xfrm>
+      </p:grpSpPr>
+      <p:sp>
+        <p:nvSpPr>
+          <p:cNvPr id="2" name="Título 1">
+            <a:extLst>
+              <a:ext uri="{FF2B5EF4-FFF2-40B4-BE49-F238E27FC236}">
+                <a16:creationId xmlns:a16="http://schemas.microsoft.com/office/drawing/2014/main" id="{83507DB9-2627-9C5E-FFDC-298F92CA51B5}"/>
+              </a:ext>
+            </a:extLst>
+          </p:cNvPr>
+          <p:cNvSpPr>
+            <a:spLocks noGrp="1"/>
+          </p:cNvSpPr>
+          <p:nvPr>
+            <p:ph type="title"/>
+          </p:nvPr>
+        </p:nvSpPr>
+        <p:spPr>
+          <a:xfrm>
+            <a:off x="1073331" y="391887"/>
+            <a:ext cx="9875520" cy="1356360"/>
+          </a:xfrm>
+        </p:spPr>
+        <p:txBody>
+          <a:bodyPr>
+            <a:normAutofit fontScale="90000"/>
+          </a:bodyPr>
+          <a:lstStyle/>
+          <a:p>
+            <a:pPr algn="ctr"/>
+            <a:r>
+              <a:rPr lang="es-AR" sz="4000" b="1" dirty="0"/>
+              <a:t>Desafío 12</a:t>
+            </a:r>
+            <a:br>
+              <a:rPr lang="es-AR" sz="4000" b="1" dirty="0"/>
+            </a:br>
+            <a:r>
+              <a:rPr lang="es-AR" sz="2000" b="1" dirty="0"/>
+              <a:t>XGBoost</a:t>
+            </a:r>
+            <a:br>
+              <a:rPr lang="es-AR" sz="6000" dirty="0"/>
+            </a:br>
+            <a:endParaRPr lang="es-AR" dirty="0"/>
+          </a:p>
+        </p:txBody>
+      </p:sp>
+      <p:pic>
+        <p:nvPicPr>
+          <p:cNvPr id="8" name="Marcador de contenido 7">
+            <a:extLst>
+              <a:ext uri="{FF2B5EF4-FFF2-40B4-BE49-F238E27FC236}">
+                <a16:creationId xmlns:a16="http://schemas.microsoft.com/office/drawing/2014/main" id="{8E427A5C-8314-3CB3-A220-BA94A77D0194}"/>
+              </a:ext>
+            </a:extLst>
+          </p:cNvPr>
+          <p:cNvPicPr>
+            <a:picLocks noGrp="1" noChangeAspect="1"/>
+          </p:cNvPicPr>
+          <p:nvPr>
+            <p:ph idx="1"/>
+          </p:nvPr>
+        </p:nvPicPr>
+        <p:blipFill>
+          <a:blip r:embed="rId2"/>
+          <a:stretch>
+            <a:fillRect/>
+          </a:stretch>
+        </p:blipFill>
+        <p:spPr>
+          <a:xfrm>
+            <a:off x="6340794" y="1964705"/>
+            <a:ext cx="5102358" cy="3817785"/>
+          </a:xfrm>
+        </p:spPr>
+      </p:pic>
+      <p:pic>
+        <p:nvPicPr>
+          <p:cNvPr id="12" name="Imagen 11">
+            <a:extLst>
+              <a:ext uri="{FF2B5EF4-FFF2-40B4-BE49-F238E27FC236}">
+                <a16:creationId xmlns:a16="http://schemas.microsoft.com/office/drawing/2014/main" id="{6AFB468A-964C-EBBB-7873-DED1C8127533}"/>
+              </a:ext>
+            </a:extLst>
+          </p:cNvPr>
+          <p:cNvPicPr>
+            <a:picLocks noChangeAspect="1"/>
+          </p:cNvPicPr>
+          <p:nvPr/>
+        </p:nvPicPr>
+        <p:blipFill>
+          <a:blip r:embed="rId3"/>
+          <a:stretch>
+            <a:fillRect/>
+          </a:stretch>
+        </p:blipFill>
+        <p:spPr>
+          <a:xfrm>
+            <a:off x="392192" y="1950721"/>
+            <a:ext cx="5240321" cy="3662876"/>
+          </a:xfrm>
+          <a:prstGeom prst="rect">
+            <a:avLst/>
+          </a:prstGeom>
+        </p:spPr>
+      </p:pic>
+    </p:spTree>
+    <p:extLst>
+      <p:ext uri="{BB962C8B-B14F-4D97-AF65-F5344CB8AC3E}">
+        <p14:creationId xmlns:p14="http://schemas.microsoft.com/office/powerpoint/2010/main" val="1804903915"/>
+      </p:ext>
+    </p:extLst>
+  </p:cSld>
+  <p:clrMapOvr>
+    <a:masterClrMapping/>
+  </p:clrMapOvr>
+</p:sld>
+</file>
+
+<file path=ppt/slides/slide9.xml><?xml version="1.0" encoding="utf-8"?>
+<p:sld xmlns:a="http://schemas.openxmlformats.org/drawingml/2006/main" xmlns:r="http://schemas.openxmlformats.org/officeDocument/2006/relationships" xmlns:p="http://schemas.openxmlformats.org/presentationml/2006/main">
+  <p:cSld>
+    <p:spTree>
+      <p:nvGrpSpPr>
+        <p:cNvPr id="1" name=""/>
+        <p:cNvGrpSpPr/>
+        <p:nvPr/>
+      </p:nvGrpSpPr>
+      <p:grpSpPr>
+        <a:xfrm>
+          <a:off x="0" y="0"/>
+          <a:ext cx="0" cy="0"/>
+          <a:chOff x="0" y="0"/>
+          <a:chExt cx="0" cy="0"/>
+        </a:xfrm>
+      </p:grpSpPr>
+      <p:sp>
+        <p:nvSpPr>
+          <p:cNvPr id="2" name="Título 1">
+            <a:extLst>
+              <a:ext uri="{FF2B5EF4-FFF2-40B4-BE49-F238E27FC236}">
+                <a16:creationId xmlns:a16="http://schemas.microsoft.com/office/drawing/2014/main" id="{83507DB9-2627-9C5E-FFDC-298F92CA51B5}"/>
+              </a:ext>
+            </a:extLst>
+          </p:cNvPr>
+          <p:cNvSpPr>
+            <a:spLocks noGrp="1"/>
+          </p:cNvSpPr>
+          <p:nvPr>
+            <p:ph type="title"/>
+          </p:nvPr>
+        </p:nvSpPr>
+        <p:spPr>
+          <a:xfrm>
+            <a:off x="1073331" y="391887"/>
+            <a:ext cx="9875520" cy="1356360"/>
+          </a:xfrm>
+        </p:spPr>
+        <p:txBody>
+          <a:bodyPr>
+            <a:normAutofit fontScale="90000"/>
+          </a:bodyPr>
+          <a:lstStyle/>
+          <a:p>
+            <a:pPr algn="ctr"/>
+            <a:r>
+              <a:rPr lang="es-AR" sz="4000" b="1" dirty="0"/>
+              <a:t>Desafío 13</a:t>
+            </a:r>
+            <a:br>
+              <a:rPr lang="es-AR" sz="4000" b="1" dirty="0"/>
+            </a:br>
+            <a:r>
+              <a:rPr lang="es-AR" sz="2000" b="1" dirty="0"/>
+              <a:t>XGBoost</a:t>
+            </a:r>
+            <a:br>
+              <a:rPr lang="es-AR" sz="6000" dirty="0"/>
+            </a:br>
+            <a:endParaRPr lang="es-AR" dirty="0"/>
+          </a:p>
+        </p:txBody>
+      </p:sp>
+      <p:pic>
+        <p:nvPicPr>
+          <p:cNvPr id="4" name="Imagen 3">
+            <a:extLst>
+              <a:ext uri="{FF2B5EF4-FFF2-40B4-BE49-F238E27FC236}">
+                <a16:creationId xmlns:a16="http://schemas.microsoft.com/office/drawing/2014/main" id="{323BED97-7BF7-5013-29FA-276306D257C4}"/>
+              </a:ext>
+            </a:extLst>
+          </p:cNvPr>
+          <p:cNvPicPr>
+            <a:picLocks noChangeAspect="1"/>
+          </p:cNvPicPr>
+          <p:nvPr/>
+        </p:nvPicPr>
+        <p:blipFill>
+          <a:blip r:embed="rId2"/>
+          <a:stretch>
+            <a:fillRect/>
+          </a:stretch>
+        </p:blipFill>
+        <p:spPr>
+          <a:xfrm>
+            <a:off x="415037" y="2055223"/>
+            <a:ext cx="5336527" cy="3584367"/>
+          </a:xfrm>
+          <a:prstGeom prst="rect">
+            <a:avLst/>
+          </a:prstGeom>
+        </p:spPr>
+      </p:pic>
+      <p:pic>
+        <p:nvPicPr>
+          <p:cNvPr id="9" name="Marcador de contenido 8">
+            <a:extLst>
+              <a:ext uri="{FF2B5EF4-FFF2-40B4-BE49-F238E27FC236}">
+                <a16:creationId xmlns:a16="http://schemas.microsoft.com/office/drawing/2014/main" id="{99B7D549-8633-98D9-3390-678C9A68AE40}"/>
+              </a:ext>
+            </a:extLst>
+          </p:cNvPr>
+          <p:cNvPicPr>
+            <a:picLocks noGrp="1" noChangeAspect="1"/>
+          </p:cNvPicPr>
+          <p:nvPr>
+            <p:ph idx="1"/>
+          </p:nvPr>
+        </p:nvPicPr>
+        <p:blipFill>
+          <a:blip r:embed="rId3"/>
+          <a:stretch>
+            <a:fillRect/>
+          </a:stretch>
+        </p:blipFill>
+        <p:spPr>
+          <a:xfrm>
+            <a:off x="6132662" y="2055223"/>
+            <a:ext cx="5134646" cy="3765407"/>
+          </a:xfrm>
+        </p:spPr>
+      </p:pic>
+    </p:spTree>
+    <p:extLst>
+      <p:ext uri="{BB962C8B-B14F-4D97-AF65-F5344CB8AC3E}">
+        <p14:creationId xmlns:p14="http://schemas.microsoft.com/office/powerpoint/2010/main" val="1378091795"/>
       </p:ext>
     </p:extLst>
   </p:cSld>

</xml_diff>